<commit_message>
Add state table example that builds an object structure from XML.  Add support for conditional state transitions.  Allow different method signatures for method actors.
</commit_message>
<xml_diff>
--- a/src/main/resources/StateTables.pptx
+++ b/src/main/resources/StateTables.pptx
@@ -7,6 +7,7 @@
   <p:sldIdLst>
     <p:sldId id="256" r:id="rId2"/>
     <p:sldId id="257" r:id="rId3"/>
+    <p:sldId id="258" r:id="rId4"/>
   </p:sldIdLst>
   <p:sldSz cx="9144000" cy="6858000" type="screen4x3"/>
   <p:notesSz cx="6858000" cy="9144000"/>
@@ -289,7 +290,8 @@
           <a:p>
             <a:fld id="{956D0292-F28F-4A70-A539-513257EB9152}" type="datetimeFigureOut">
               <a:rPr lang="en-US" smtClean="0"/>
-              <a:t>12/18/2016</a:t>
+              <a:pPr/>
+              <a:t>12/27/2016</a:t>
             </a:fld>
             <a:endParaRPr lang="en-US"/>
           </a:p>
@@ -331,6 +333,7 @@
           <a:p>
             <a:fld id="{9502E337-E35C-4D24-8930-A3847E86B233}" type="slidenum">
               <a:rPr lang="en-US" smtClean="0"/>
+              <a:pPr/>
               <a:t>‹#›</a:t>
             </a:fld>
             <a:endParaRPr lang="en-US"/>
@@ -454,7 +457,8 @@
           <a:p>
             <a:fld id="{956D0292-F28F-4A70-A539-513257EB9152}" type="datetimeFigureOut">
               <a:rPr lang="en-US" smtClean="0"/>
-              <a:t>12/18/2016</a:t>
+              <a:pPr/>
+              <a:t>12/27/2016</a:t>
             </a:fld>
             <a:endParaRPr lang="en-US"/>
           </a:p>
@@ -496,6 +500,7 @@
           <a:p>
             <a:fld id="{9502E337-E35C-4D24-8930-A3847E86B233}" type="slidenum">
               <a:rPr lang="en-US" smtClean="0"/>
+              <a:pPr/>
               <a:t>‹#›</a:t>
             </a:fld>
             <a:endParaRPr lang="en-US"/>
@@ -629,7 +634,8 @@
           <a:p>
             <a:fld id="{956D0292-F28F-4A70-A539-513257EB9152}" type="datetimeFigureOut">
               <a:rPr lang="en-US" smtClean="0"/>
-              <a:t>12/18/2016</a:t>
+              <a:pPr/>
+              <a:t>12/27/2016</a:t>
             </a:fld>
             <a:endParaRPr lang="en-US"/>
           </a:p>
@@ -671,6 +677,7 @@
           <a:p>
             <a:fld id="{9502E337-E35C-4D24-8930-A3847E86B233}" type="slidenum">
               <a:rPr lang="en-US" smtClean="0"/>
+              <a:pPr/>
               <a:t>‹#›</a:t>
             </a:fld>
             <a:endParaRPr lang="en-US"/>
@@ -794,7 +801,8 @@
           <a:p>
             <a:fld id="{956D0292-F28F-4A70-A539-513257EB9152}" type="datetimeFigureOut">
               <a:rPr lang="en-US" smtClean="0"/>
-              <a:t>12/18/2016</a:t>
+              <a:pPr/>
+              <a:t>12/27/2016</a:t>
             </a:fld>
             <a:endParaRPr lang="en-US"/>
           </a:p>
@@ -836,6 +844,7 @@
           <a:p>
             <a:fld id="{9502E337-E35C-4D24-8930-A3847E86B233}" type="slidenum">
               <a:rPr lang="en-US" smtClean="0"/>
+              <a:pPr/>
               <a:t>‹#›</a:t>
             </a:fld>
             <a:endParaRPr lang="en-US"/>
@@ -1035,7 +1044,8 @@
           <a:p>
             <a:fld id="{956D0292-F28F-4A70-A539-513257EB9152}" type="datetimeFigureOut">
               <a:rPr lang="en-US" smtClean="0"/>
-              <a:t>12/18/2016</a:t>
+              <a:pPr/>
+              <a:t>12/27/2016</a:t>
             </a:fld>
             <a:endParaRPr lang="en-US"/>
           </a:p>
@@ -1077,6 +1087,7 @@
           <a:p>
             <a:fld id="{9502E337-E35C-4D24-8930-A3847E86B233}" type="slidenum">
               <a:rPr lang="en-US" smtClean="0"/>
+              <a:pPr/>
               <a:t>‹#›</a:t>
             </a:fld>
             <a:endParaRPr lang="en-US"/>
@@ -1318,7 +1329,8 @@
           <a:p>
             <a:fld id="{956D0292-F28F-4A70-A539-513257EB9152}" type="datetimeFigureOut">
               <a:rPr lang="en-US" smtClean="0"/>
-              <a:t>12/18/2016</a:t>
+              <a:pPr/>
+              <a:t>12/27/2016</a:t>
             </a:fld>
             <a:endParaRPr lang="en-US"/>
           </a:p>
@@ -1360,6 +1372,7 @@
           <a:p>
             <a:fld id="{9502E337-E35C-4D24-8930-A3847E86B233}" type="slidenum">
               <a:rPr lang="en-US" smtClean="0"/>
+              <a:pPr/>
               <a:t>‹#›</a:t>
             </a:fld>
             <a:endParaRPr lang="en-US"/>
@@ -1735,7 +1748,8 @@
           <a:p>
             <a:fld id="{956D0292-F28F-4A70-A539-513257EB9152}" type="datetimeFigureOut">
               <a:rPr lang="en-US" smtClean="0"/>
-              <a:t>12/18/2016</a:t>
+              <a:pPr/>
+              <a:t>12/27/2016</a:t>
             </a:fld>
             <a:endParaRPr lang="en-US"/>
           </a:p>
@@ -1777,6 +1791,7 @@
           <a:p>
             <a:fld id="{9502E337-E35C-4D24-8930-A3847E86B233}" type="slidenum">
               <a:rPr lang="en-US" smtClean="0"/>
+              <a:pPr/>
               <a:t>‹#›</a:t>
             </a:fld>
             <a:endParaRPr lang="en-US"/>
@@ -1848,7 +1863,8 @@
           <a:p>
             <a:fld id="{956D0292-F28F-4A70-A539-513257EB9152}" type="datetimeFigureOut">
               <a:rPr lang="en-US" smtClean="0"/>
-              <a:t>12/18/2016</a:t>
+              <a:pPr/>
+              <a:t>12/27/2016</a:t>
             </a:fld>
             <a:endParaRPr lang="en-US"/>
           </a:p>
@@ -1890,6 +1906,7 @@
           <a:p>
             <a:fld id="{9502E337-E35C-4D24-8930-A3847E86B233}" type="slidenum">
               <a:rPr lang="en-US" smtClean="0"/>
+              <a:pPr/>
               <a:t>‹#›</a:t>
             </a:fld>
             <a:endParaRPr lang="en-US"/>
@@ -1938,7 +1955,8 @@
           <a:p>
             <a:fld id="{956D0292-F28F-4A70-A539-513257EB9152}" type="datetimeFigureOut">
               <a:rPr lang="en-US" smtClean="0"/>
-              <a:t>12/18/2016</a:t>
+              <a:pPr/>
+              <a:t>12/27/2016</a:t>
             </a:fld>
             <a:endParaRPr lang="en-US"/>
           </a:p>
@@ -1980,6 +1998,7 @@
           <a:p>
             <a:fld id="{9502E337-E35C-4D24-8930-A3847E86B233}" type="slidenum">
               <a:rPr lang="en-US" smtClean="0"/>
+              <a:pPr/>
               <a:t>‹#›</a:t>
             </a:fld>
             <a:endParaRPr lang="en-US"/>
@@ -2210,7 +2229,8 @@
           <a:p>
             <a:fld id="{956D0292-F28F-4A70-A539-513257EB9152}" type="datetimeFigureOut">
               <a:rPr lang="en-US" smtClean="0"/>
-              <a:t>12/18/2016</a:t>
+              <a:pPr/>
+              <a:t>12/27/2016</a:t>
             </a:fld>
             <a:endParaRPr lang="en-US"/>
           </a:p>
@@ -2252,6 +2272,7 @@
           <a:p>
             <a:fld id="{9502E337-E35C-4D24-8930-A3847E86B233}" type="slidenum">
               <a:rPr lang="en-US" smtClean="0"/>
+              <a:pPr/>
               <a:t>‹#›</a:t>
             </a:fld>
             <a:endParaRPr lang="en-US"/>
@@ -2458,7 +2479,8 @@
           <a:p>
             <a:fld id="{956D0292-F28F-4A70-A539-513257EB9152}" type="datetimeFigureOut">
               <a:rPr lang="en-US" smtClean="0"/>
-              <a:t>12/18/2016</a:t>
+              <a:pPr/>
+              <a:t>12/27/2016</a:t>
             </a:fld>
             <a:endParaRPr lang="en-US"/>
           </a:p>
@@ -2500,6 +2522,7 @@
           <a:p>
             <a:fld id="{9502E337-E35C-4D24-8930-A3847E86B233}" type="slidenum">
               <a:rPr lang="en-US" smtClean="0"/>
+              <a:pPr/>
               <a:t>‹#›</a:t>
             </a:fld>
             <a:endParaRPr lang="en-US"/>
@@ -2666,7 +2689,8 @@
           <a:p>
             <a:fld id="{956D0292-F28F-4A70-A539-513257EB9152}" type="datetimeFigureOut">
               <a:rPr lang="en-US" smtClean="0"/>
-              <a:t>12/18/2016</a:t>
+              <a:pPr/>
+              <a:t>12/27/2016</a:t>
             </a:fld>
             <a:endParaRPr lang="en-US"/>
           </a:p>
@@ -2744,6 +2768,7 @@
           <a:p>
             <a:fld id="{9502E337-E35C-4D24-8930-A3847E86B233}" type="slidenum">
               <a:rPr lang="en-US" smtClean="0"/>
+              <a:pPr/>
               <a:t>‹#›</a:t>
             </a:fld>
             <a:endParaRPr lang="en-US"/>
@@ -3138,7 +3163,7 @@
         </p:nvSpPr>
         <p:spPr>
           <a:xfrm>
-            <a:off x="1066800" y="1981200"/>
+            <a:off x="1600200" y="1905000"/>
             <a:ext cx="1295400" cy="609600"/>
           </a:xfrm>
           <a:prstGeom prst="ellipse">
@@ -3198,7 +3223,7 @@
         </p:nvSpPr>
         <p:spPr>
           <a:xfrm>
-            <a:off x="3352800" y="1981200"/>
+            <a:off x="3962400" y="2209800"/>
             <a:ext cx="1524000" cy="685800"/>
           </a:xfrm>
           <a:prstGeom prst="ellipse">
@@ -3258,7 +3283,7 @@
         </p:nvSpPr>
         <p:spPr>
           <a:xfrm>
-            <a:off x="5638800" y="2209800"/>
+            <a:off x="4648200" y="3657600"/>
             <a:ext cx="1295400" cy="609600"/>
           </a:xfrm>
           <a:prstGeom prst="ellipse">
@@ -3318,7 +3343,7 @@
         </p:nvSpPr>
         <p:spPr>
           <a:xfrm>
-            <a:off x="5562600" y="3505200"/>
+            <a:off x="3505200" y="4953000"/>
             <a:ext cx="1295400" cy="609600"/>
           </a:xfrm>
           <a:prstGeom prst="ellipse">
@@ -3374,20 +3399,19 @@
         <p:nvCxnSpPr>
           <p:cNvPr id="8" name="Straight Arrow Connector 7"/>
           <p:cNvCxnSpPr>
-            <a:stCxn id="3" idx="7"/>
+            <a:stCxn id="3" idx="6"/>
             <a:endCxn id="4" idx="2"/>
           </p:cNvCxnSpPr>
           <p:nvPr/>
         </p:nvCxnSpPr>
         <p:spPr>
-          <a:xfrm rot="16200000" flipH="1">
-            <a:off x="2635833" y="1607134"/>
-            <a:ext cx="253626" cy="1180307"/>
-          </a:xfrm>
-          <a:prstGeom prst="curvedConnector4">
+          <a:xfrm>
+            <a:off x="2895600" y="2209800"/>
+            <a:ext cx="1066800" cy="342900"/>
+          </a:xfrm>
+          <a:prstGeom prst="curvedConnector3">
             <a:avLst>
-              <a:gd name="adj1" fmla="val -90133"/>
-              <a:gd name="adj2" fmla="val 58036"/>
+              <a:gd name="adj1" fmla="val 50000"/>
             </a:avLst>
           </a:prstGeom>
           <a:ln w="25400">
@@ -3420,7 +3444,7 @@
         </p:nvSpPr>
         <p:spPr>
           <a:xfrm>
-            <a:off x="1981200" y="1524000"/>
+            <a:off x="2971800" y="1905000"/>
             <a:ext cx="1219200" cy="276999"/>
           </a:xfrm>
           <a:prstGeom prst="rect">
@@ -3437,6 +3461,1432 @@
             <a:r>
               <a:rPr lang="en-US" sz="1200" dirty="0" smtClean="0"/>
               <a:t>Start Document</a:t>
+            </a:r>
+            <a:endParaRPr lang="en-US" sz="1200" dirty="0"/>
+          </a:p>
+        </p:txBody>
+      </p:sp>
+      <p:cxnSp>
+        <p:nvCxnSpPr>
+          <p:cNvPr id="13" name="Straight Arrow Connector 7"/>
+          <p:cNvCxnSpPr>
+            <a:stCxn id="4" idx="4"/>
+            <a:endCxn id="5" idx="0"/>
+          </p:cNvCxnSpPr>
+          <p:nvPr/>
+        </p:nvCxnSpPr>
+        <p:spPr>
+          <a:xfrm rot="16200000" flipH="1">
+            <a:off x="4629150" y="2990850"/>
+            <a:ext cx="762000" cy="571500"/>
+          </a:xfrm>
+          <a:prstGeom prst="curvedConnector3">
+            <a:avLst>
+              <a:gd name="adj1" fmla="val 50000"/>
+            </a:avLst>
+          </a:prstGeom>
+          <a:ln w="25400">
+            <a:solidFill>
+              <a:schemeClr val="tx1"/>
+            </a:solidFill>
+            <a:tailEnd type="arrow"/>
+          </a:ln>
+        </p:spPr>
+        <p:style>
+          <a:lnRef idx="1">
+            <a:schemeClr val="accent1"/>
+          </a:lnRef>
+          <a:fillRef idx="0">
+            <a:schemeClr val="accent1"/>
+          </a:fillRef>
+          <a:effectRef idx="0">
+            <a:schemeClr val="accent1"/>
+          </a:effectRef>
+          <a:fontRef idx="minor">
+            <a:schemeClr val="tx1"/>
+          </a:fontRef>
+        </p:style>
+      </p:cxnSp>
+      <p:cxnSp>
+        <p:nvCxnSpPr>
+          <p:cNvPr id="18" name="Straight Arrow Connector 7"/>
+          <p:cNvCxnSpPr>
+            <a:stCxn id="5" idx="3"/>
+            <a:endCxn id="6" idx="0"/>
+          </p:cNvCxnSpPr>
+          <p:nvPr/>
+        </p:nvCxnSpPr>
+        <p:spPr>
+          <a:xfrm rot="5400000">
+            <a:off x="4107867" y="4222960"/>
+            <a:ext cx="775074" cy="685007"/>
+          </a:xfrm>
+          <a:prstGeom prst="curvedConnector3">
+            <a:avLst>
+              <a:gd name="adj1" fmla="val 50000"/>
+            </a:avLst>
+          </a:prstGeom>
+          <a:ln w="25400">
+            <a:solidFill>
+              <a:schemeClr val="tx1"/>
+            </a:solidFill>
+            <a:tailEnd type="arrow"/>
+          </a:ln>
+        </p:spPr>
+        <p:style>
+          <a:lnRef idx="1">
+            <a:schemeClr val="accent1"/>
+          </a:lnRef>
+          <a:fillRef idx="0">
+            <a:schemeClr val="accent1"/>
+          </a:fillRef>
+          <a:effectRef idx="0">
+            <a:schemeClr val="accent1"/>
+          </a:effectRef>
+          <a:fontRef idx="minor">
+            <a:schemeClr val="tx1"/>
+          </a:fontRef>
+        </p:style>
+      </p:cxnSp>
+      <p:cxnSp>
+        <p:nvCxnSpPr>
+          <p:cNvPr id="21" name="Straight Arrow Connector 7"/>
+          <p:cNvCxnSpPr>
+            <a:stCxn id="6" idx="6"/>
+            <a:endCxn id="5" idx="4"/>
+          </p:cNvCxnSpPr>
+          <p:nvPr/>
+        </p:nvCxnSpPr>
+        <p:spPr>
+          <a:xfrm flipV="1">
+            <a:off x="4800600" y="4267200"/>
+            <a:ext cx="495300" cy="990600"/>
+          </a:xfrm>
+          <a:prstGeom prst="curvedConnector2">
+            <a:avLst/>
+          </a:prstGeom>
+          <a:ln w="25400">
+            <a:solidFill>
+              <a:schemeClr val="tx1"/>
+            </a:solidFill>
+            <a:tailEnd type="arrow"/>
+          </a:ln>
+        </p:spPr>
+        <p:style>
+          <a:lnRef idx="1">
+            <a:schemeClr val="accent1"/>
+          </a:lnRef>
+          <a:fillRef idx="0">
+            <a:schemeClr val="accent1"/>
+          </a:fillRef>
+          <a:effectRef idx="0">
+            <a:schemeClr val="accent1"/>
+          </a:effectRef>
+          <a:fontRef idx="minor">
+            <a:schemeClr val="tx1"/>
+          </a:fontRef>
+        </p:style>
+      </p:cxnSp>
+      <p:cxnSp>
+        <p:nvCxnSpPr>
+          <p:cNvPr id="32" name="Straight Arrow Connector 7"/>
+          <p:cNvCxnSpPr>
+            <a:stCxn id="5" idx="6"/>
+            <a:endCxn id="5" idx="7"/>
+          </p:cNvCxnSpPr>
+          <p:nvPr/>
+        </p:nvCxnSpPr>
+        <p:spPr>
+          <a:xfrm flipH="1" flipV="1">
+            <a:off x="5753893" y="3746874"/>
+            <a:ext cx="189707" cy="215526"/>
+          </a:xfrm>
+          <a:prstGeom prst="curvedConnector4">
+            <a:avLst>
+              <a:gd name="adj1" fmla="val -120502"/>
+              <a:gd name="adj2" fmla="val 247488"/>
+            </a:avLst>
+          </a:prstGeom>
+          <a:ln w="25400">
+            <a:solidFill>
+              <a:schemeClr val="tx1"/>
+            </a:solidFill>
+            <a:tailEnd type="arrow"/>
+          </a:ln>
+        </p:spPr>
+        <p:style>
+          <a:lnRef idx="1">
+            <a:schemeClr val="accent1"/>
+          </a:lnRef>
+          <a:fillRef idx="0">
+            <a:schemeClr val="accent1"/>
+          </a:fillRef>
+          <a:effectRef idx="0">
+            <a:schemeClr val="accent1"/>
+          </a:effectRef>
+          <a:fontRef idx="minor">
+            <a:schemeClr val="tx1"/>
+          </a:fontRef>
+        </p:style>
+      </p:cxnSp>
+      <p:cxnSp>
+        <p:nvCxnSpPr>
+          <p:cNvPr id="37" name="Straight Arrow Connector 7"/>
+          <p:cNvCxnSpPr>
+            <a:stCxn id="5" idx="6"/>
+            <a:endCxn id="5" idx="5"/>
+          </p:cNvCxnSpPr>
+          <p:nvPr/>
+        </p:nvCxnSpPr>
+        <p:spPr>
+          <a:xfrm flipH="1">
+            <a:off x="5753893" y="3962400"/>
+            <a:ext cx="189707" cy="215526"/>
+          </a:xfrm>
+          <a:prstGeom prst="curvedConnector4">
+            <a:avLst>
+              <a:gd name="adj1" fmla="val -120502"/>
+              <a:gd name="adj2" fmla="val 247488"/>
+            </a:avLst>
+          </a:prstGeom>
+          <a:ln w="25400">
+            <a:solidFill>
+              <a:schemeClr val="tx1"/>
+            </a:solidFill>
+            <a:tailEnd type="arrow"/>
+          </a:ln>
+        </p:spPr>
+        <p:style>
+          <a:lnRef idx="1">
+            <a:schemeClr val="accent1"/>
+          </a:lnRef>
+          <a:fillRef idx="0">
+            <a:schemeClr val="accent1"/>
+          </a:fillRef>
+          <a:effectRef idx="0">
+            <a:schemeClr val="accent1"/>
+          </a:effectRef>
+          <a:fontRef idx="minor">
+            <a:schemeClr val="tx1"/>
+          </a:fontRef>
+        </p:style>
+      </p:cxnSp>
+      <p:cxnSp>
+        <p:nvCxnSpPr>
+          <p:cNvPr id="42" name="Straight Arrow Connector 7"/>
+          <p:cNvCxnSpPr>
+            <a:stCxn id="4" idx="6"/>
+            <a:endCxn id="4" idx="7"/>
+          </p:cNvCxnSpPr>
+          <p:nvPr/>
+        </p:nvCxnSpPr>
+        <p:spPr>
+          <a:xfrm flipH="1" flipV="1">
+            <a:off x="5263215" y="2310233"/>
+            <a:ext cx="223185" cy="242467"/>
+          </a:xfrm>
+          <a:prstGeom prst="curvedConnector4">
+            <a:avLst>
+              <a:gd name="adj1" fmla="val -102426"/>
+              <a:gd name="adj2" fmla="val 235702"/>
+            </a:avLst>
+          </a:prstGeom>
+          <a:ln w="25400">
+            <a:solidFill>
+              <a:schemeClr val="tx1"/>
+            </a:solidFill>
+            <a:tailEnd type="arrow"/>
+          </a:ln>
+        </p:spPr>
+        <p:style>
+          <a:lnRef idx="1">
+            <a:schemeClr val="accent1"/>
+          </a:lnRef>
+          <a:fillRef idx="0">
+            <a:schemeClr val="accent1"/>
+          </a:fillRef>
+          <a:effectRef idx="0">
+            <a:schemeClr val="accent1"/>
+          </a:effectRef>
+          <a:fontRef idx="minor">
+            <a:schemeClr val="tx1"/>
+          </a:fontRef>
+        </p:style>
+      </p:cxnSp>
+      <p:sp>
+        <p:nvSpPr>
+          <p:cNvPr id="46" name="TextBox 45"/>
+          <p:cNvSpPr txBox="1"/>
+          <p:nvPr/>
+        </p:nvSpPr>
+        <p:spPr>
+          <a:xfrm>
+            <a:off x="5105400" y="1676400"/>
+            <a:ext cx="1066800" cy="276999"/>
+          </a:xfrm>
+          <a:prstGeom prst="rect">
+            <a:avLst/>
+          </a:prstGeom>
+          <a:noFill/>
+        </p:spPr>
+        <p:txBody>
+          <a:bodyPr wrap="square" rtlCol="0">
+            <a:spAutoFit/>
+          </a:bodyPr>
+          <a:lstStyle/>
+          <a:p>
+            <a:r>
+              <a:rPr lang="en-US" sz="1200" dirty="0" smtClean="0"/>
+              <a:t>White Space</a:t>
+            </a:r>
+            <a:endParaRPr lang="en-US" sz="1200" dirty="0"/>
+          </a:p>
+        </p:txBody>
+      </p:sp>
+      <p:sp>
+        <p:nvSpPr>
+          <p:cNvPr id="47" name="TextBox 46"/>
+          <p:cNvSpPr txBox="1"/>
+          <p:nvPr/>
+        </p:nvSpPr>
+        <p:spPr>
+          <a:xfrm>
+            <a:off x="5562600" y="4572000"/>
+            <a:ext cx="1066800" cy="276999"/>
+          </a:xfrm>
+          <a:prstGeom prst="rect">
+            <a:avLst/>
+          </a:prstGeom>
+          <a:noFill/>
+        </p:spPr>
+        <p:txBody>
+          <a:bodyPr wrap="square" rtlCol="0">
+            <a:spAutoFit/>
+          </a:bodyPr>
+          <a:lstStyle/>
+          <a:p>
+            <a:r>
+              <a:rPr lang="en-US" sz="1200" dirty="0" smtClean="0"/>
+              <a:t>White Space</a:t>
+            </a:r>
+            <a:endParaRPr lang="en-US" sz="1200" dirty="0"/>
+          </a:p>
+        </p:txBody>
+      </p:sp>
+      <p:sp>
+        <p:nvSpPr>
+          <p:cNvPr id="48" name="TextBox 47"/>
+          <p:cNvSpPr txBox="1"/>
+          <p:nvPr/>
+        </p:nvSpPr>
+        <p:spPr>
+          <a:xfrm>
+            <a:off x="2971800" y="5867400"/>
+            <a:ext cx="1066800" cy="276999"/>
+          </a:xfrm>
+          <a:prstGeom prst="rect">
+            <a:avLst/>
+          </a:prstGeom>
+          <a:noFill/>
+        </p:spPr>
+        <p:txBody>
+          <a:bodyPr wrap="square" rtlCol="0">
+            <a:spAutoFit/>
+          </a:bodyPr>
+          <a:lstStyle/>
+          <a:p>
+            <a:r>
+              <a:rPr lang="en-US" sz="1200" dirty="0" smtClean="0"/>
+              <a:t>White Space</a:t>
+            </a:r>
+            <a:endParaRPr lang="en-US" sz="1200" dirty="0"/>
+          </a:p>
+        </p:txBody>
+      </p:sp>
+      <p:cxnSp>
+        <p:nvCxnSpPr>
+          <p:cNvPr id="52" name="Straight Arrow Connector 7"/>
+          <p:cNvCxnSpPr>
+            <a:stCxn id="5" idx="2"/>
+            <a:endCxn id="5" idx="1"/>
+          </p:cNvCxnSpPr>
+          <p:nvPr/>
+        </p:nvCxnSpPr>
+        <p:spPr>
+          <a:xfrm rot="10800000" flipH="1">
+            <a:off x="4648199" y="3746874"/>
+            <a:ext cx="189707" cy="215526"/>
+          </a:xfrm>
+          <a:prstGeom prst="curvedConnector4">
+            <a:avLst>
+              <a:gd name="adj1" fmla="val -120502"/>
+              <a:gd name="adj2" fmla="val 247488"/>
+            </a:avLst>
+          </a:prstGeom>
+          <a:ln w="25400">
+            <a:solidFill>
+              <a:schemeClr val="tx1"/>
+            </a:solidFill>
+            <a:tailEnd type="arrow"/>
+          </a:ln>
+        </p:spPr>
+        <p:style>
+          <a:lnRef idx="1">
+            <a:schemeClr val="accent1"/>
+          </a:lnRef>
+          <a:fillRef idx="0">
+            <a:schemeClr val="accent1"/>
+          </a:fillRef>
+          <a:effectRef idx="0">
+            <a:schemeClr val="accent1"/>
+          </a:effectRef>
+          <a:fontRef idx="minor">
+            <a:schemeClr val="tx1"/>
+          </a:fontRef>
+        </p:style>
+      </p:cxnSp>
+      <p:cxnSp>
+        <p:nvCxnSpPr>
+          <p:cNvPr id="57" name="Straight Arrow Connector 7"/>
+          <p:cNvCxnSpPr>
+            <a:stCxn id="6" idx="2"/>
+            <a:endCxn id="6" idx="3"/>
+          </p:cNvCxnSpPr>
+          <p:nvPr/>
+        </p:nvCxnSpPr>
+        <p:spPr>
+          <a:xfrm rot="10800000" flipH="1" flipV="1">
+            <a:off x="3505199" y="5257800"/>
+            <a:ext cx="189707" cy="215526"/>
+          </a:xfrm>
+          <a:prstGeom prst="curvedConnector4">
+            <a:avLst>
+              <a:gd name="adj1" fmla="val -120502"/>
+              <a:gd name="adj2" fmla="val 247488"/>
+            </a:avLst>
+          </a:prstGeom>
+          <a:ln w="25400">
+            <a:solidFill>
+              <a:schemeClr val="tx1"/>
+            </a:solidFill>
+            <a:tailEnd type="arrow"/>
+          </a:ln>
+        </p:spPr>
+        <p:style>
+          <a:lnRef idx="1">
+            <a:schemeClr val="accent1"/>
+          </a:lnRef>
+          <a:fillRef idx="0">
+            <a:schemeClr val="accent1"/>
+          </a:fillRef>
+          <a:effectRef idx="0">
+            <a:schemeClr val="accent1"/>
+          </a:effectRef>
+          <a:fontRef idx="minor">
+            <a:schemeClr val="tx1"/>
+          </a:fontRef>
+        </p:style>
+      </p:cxnSp>
+      <p:sp>
+        <p:nvSpPr>
+          <p:cNvPr id="62" name="TextBox 61"/>
+          <p:cNvSpPr txBox="1"/>
+          <p:nvPr/>
+        </p:nvSpPr>
+        <p:spPr>
+          <a:xfrm>
+            <a:off x="3733800" y="4343400"/>
+            <a:ext cx="914400" cy="461665"/>
+          </a:xfrm>
+          <a:prstGeom prst="rect">
+            <a:avLst/>
+          </a:prstGeom>
+          <a:noFill/>
+        </p:spPr>
+        <p:txBody>
+          <a:bodyPr wrap="square" rtlCol="0">
+            <a:spAutoFit/>
+          </a:bodyPr>
+          <a:lstStyle/>
+          <a:p>
+            <a:r>
+              <a:rPr lang="en-US" sz="1200" dirty="0" smtClean="0"/>
+              <a:t>Character Data</a:t>
+            </a:r>
+            <a:endParaRPr lang="en-US" sz="1200" dirty="0"/>
+          </a:p>
+        </p:txBody>
+      </p:sp>
+      <p:cxnSp>
+        <p:nvCxnSpPr>
+          <p:cNvPr id="63" name="Straight Arrow Connector 7"/>
+          <p:cNvCxnSpPr>
+            <a:stCxn id="6" idx="4"/>
+            <a:endCxn id="6" idx="5"/>
+          </p:cNvCxnSpPr>
+          <p:nvPr/>
+        </p:nvCxnSpPr>
+        <p:spPr>
+          <a:xfrm rot="5400000" flipH="1" flipV="1">
+            <a:off x="4337259" y="5288966"/>
+            <a:ext cx="89274" cy="457993"/>
+          </a:xfrm>
+          <a:prstGeom prst="curvedConnector3">
+            <a:avLst>
+              <a:gd name="adj1" fmla="val -256066"/>
+            </a:avLst>
+          </a:prstGeom>
+          <a:ln w="25400">
+            <a:solidFill>
+              <a:schemeClr val="tx1"/>
+            </a:solidFill>
+            <a:tailEnd type="arrow"/>
+          </a:ln>
+        </p:spPr>
+        <p:style>
+          <a:lnRef idx="1">
+            <a:schemeClr val="accent1"/>
+          </a:lnRef>
+          <a:fillRef idx="0">
+            <a:schemeClr val="accent1"/>
+          </a:fillRef>
+          <a:effectRef idx="0">
+            <a:schemeClr val="accent1"/>
+          </a:effectRef>
+          <a:fontRef idx="minor">
+            <a:schemeClr val="tx1"/>
+          </a:fontRef>
+        </p:style>
+      </p:cxnSp>
+      <p:sp>
+        <p:nvSpPr>
+          <p:cNvPr id="68" name="TextBox 67"/>
+          <p:cNvSpPr txBox="1"/>
+          <p:nvPr/>
+        </p:nvSpPr>
+        <p:spPr>
+          <a:xfrm>
+            <a:off x="3962400" y="5867400"/>
+            <a:ext cx="1143000" cy="276999"/>
+          </a:xfrm>
+          <a:prstGeom prst="rect">
+            <a:avLst/>
+          </a:prstGeom>
+          <a:noFill/>
+        </p:spPr>
+        <p:txBody>
+          <a:bodyPr wrap="square" rtlCol="0">
+            <a:spAutoFit/>
+          </a:bodyPr>
+          <a:lstStyle/>
+          <a:p>
+            <a:r>
+              <a:rPr lang="en-US" sz="1200" dirty="0" smtClean="0"/>
+              <a:t>Character Data</a:t>
+            </a:r>
+            <a:endParaRPr lang="en-US" sz="1200" dirty="0"/>
+          </a:p>
+        </p:txBody>
+      </p:sp>
+      <p:sp>
+        <p:nvSpPr>
+          <p:cNvPr id="69" name="TextBox 68"/>
+          <p:cNvSpPr txBox="1"/>
+          <p:nvPr/>
+        </p:nvSpPr>
+        <p:spPr>
+          <a:xfrm>
+            <a:off x="5105400" y="5029200"/>
+            <a:ext cx="1143000" cy="461665"/>
+          </a:xfrm>
+          <a:prstGeom prst="rect">
+            <a:avLst/>
+          </a:prstGeom>
+          <a:noFill/>
+        </p:spPr>
+        <p:txBody>
+          <a:bodyPr wrap="square" rtlCol="0">
+            <a:spAutoFit/>
+          </a:bodyPr>
+          <a:lstStyle/>
+          <a:p>
+            <a:r>
+              <a:rPr lang="en-US" sz="1200" dirty="0" smtClean="0"/>
+              <a:t>End Element</a:t>
+            </a:r>
+          </a:p>
+          <a:p>
+            <a:r>
+              <a:rPr lang="en-US" sz="1200" dirty="0" smtClean="0"/>
+              <a:t>[</a:t>
+            </a:r>
+            <a:r>
+              <a:rPr lang="en-US" sz="1200" b="1" dirty="0" smtClean="0"/>
+              <a:t>Simple Value</a:t>
+            </a:r>
+            <a:r>
+              <a:rPr lang="en-US" sz="1200" dirty="0" smtClean="0"/>
+              <a:t>]</a:t>
+            </a:r>
+            <a:endParaRPr lang="en-US" sz="1200" dirty="0"/>
+          </a:p>
+        </p:txBody>
+      </p:sp>
+      <p:sp>
+        <p:nvSpPr>
+          <p:cNvPr id="70" name="TextBox 69"/>
+          <p:cNvSpPr txBox="1"/>
+          <p:nvPr/>
+        </p:nvSpPr>
+        <p:spPr>
+          <a:xfrm>
+            <a:off x="3581400" y="3048000"/>
+            <a:ext cx="1143000" cy="461665"/>
+          </a:xfrm>
+          <a:prstGeom prst="rect">
+            <a:avLst/>
+          </a:prstGeom>
+          <a:noFill/>
+        </p:spPr>
+        <p:txBody>
+          <a:bodyPr wrap="square" rtlCol="0">
+            <a:spAutoFit/>
+          </a:bodyPr>
+          <a:lstStyle/>
+          <a:p>
+            <a:r>
+              <a:rPr lang="en-US" sz="1200" dirty="0" smtClean="0"/>
+              <a:t>End Element</a:t>
+            </a:r>
+          </a:p>
+          <a:p>
+            <a:r>
+              <a:rPr lang="en-US" sz="1200" dirty="0" smtClean="0"/>
+              <a:t>[</a:t>
+            </a:r>
+            <a:r>
+              <a:rPr lang="en-US" sz="1200" b="1" dirty="0" smtClean="0"/>
+              <a:t>Object Value</a:t>
+            </a:r>
+            <a:r>
+              <a:rPr lang="en-US" sz="1200" dirty="0" smtClean="0"/>
+              <a:t>]</a:t>
+            </a:r>
+            <a:endParaRPr lang="en-US" sz="1200" dirty="0"/>
+          </a:p>
+        </p:txBody>
+      </p:sp>
+      <p:sp>
+        <p:nvSpPr>
+          <p:cNvPr id="71" name="TextBox 70"/>
+          <p:cNvSpPr txBox="1"/>
+          <p:nvPr/>
+        </p:nvSpPr>
+        <p:spPr>
+          <a:xfrm>
+            <a:off x="6172200" y="3429000"/>
+            <a:ext cx="1143000" cy="461665"/>
+          </a:xfrm>
+          <a:prstGeom prst="rect">
+            <a:avLst/>
+          </a:prstGeom>
+          <a:noFill/>
+        </p:spPr>
+        <p:txBody>
+          <a:bodyPr wrap="square" rtlCol="0">
+            <a:spAutoFit/>
+          </a:bodyPr>
+          <a:lstStyle/>
+          <a:p>
+            <a:r>
+              <a:rPr lang="en-US" sz="1200" dirty="0" smtClean="0"/>
+              <a:t>Start Element</a:t>
+            </a:r>
+          </a:p>
+          <a:p>
+            <a:r>
+              <a:rPr lang="en-US" sz="1200" dirty="0" smtClean="0"/>
+              <a:t>[</a:t>
+            </a:r>
+            <a:r>
+              <a:rPr lang="en-US" sz="1200" b="1" dirty="0" smtClean="0"/>
+              <a:t>Entry Start</a:t>
+            </a:r>
+            <a:r>
+              <a:rPr lang="en-US" sz="1200" dirty="0" smtClean="0"/>
+              <a:t>]</a:t>
+            </a:r>
+            <a:endParaRPr lang="en-US" sz="1200" dirty="0"/>
+          </a:p>
+        </p:txBody>
+      </p:sp>
+      <p:sp>
+        <p:nvSpPr>
+          <p:cNvPr id="72" name="TextBox 71"/>
+          <p:cNvSpPr txBox="1"/>
+          <p:nvPr/>
+        </p:nvSpPr>
+        <p:spPr>
+          <a:xfrm>
+            <a:off x="5029200" y="2895600"/>
+            <a:ext cx="1143000" cy="461665"/>
+          </a:xfrm>
+          <a:prstGeom prst="rect">
+            <a:avLst/>
+          </a:prstGeom>
+          <a:noFill/>
+        </p:spPr>
+        <p:txBody>
+          <a:bodyPr wrap="square" rtlCol="0">
+            <a:spAutoFit/>
+          </a:bodyPr>
+          <a:lstStyle/>
+          <a:p>
+            <a:r>
+              <a:rPr lang="en-US" sz="1200" dirty="0" smtClean="0"/>
+              <a:t>Start Element</a:t>
+            </a:r>
+          </a:p>
+          <a:p>
+            <a:r>
+              <a:rPr lang="en-US" sz="1200" dirty="0" smtClean="0"/>
+              <a:t>[</a:t>
+            </a:r>
+            <a:r>
+              <a:rPr lang="en-US" sz="1200" b="1" dirty="0" smtClean="0"/>
+              <a:t>Root Start</a:t>
+            </a:r>
+            <a:r>
+              <a:rPr lang="en-US" sz="1200" dirty="0" smtClean="0"/>
+              <a:t>]</a:t>
+            </a:r>
+            <a:endParaRPr lang="en-US" sz="1200" dirty="0"/>
+          </a:p>
+        </p:txBody>
+      </p:sp>
+      <p:cxnSp>
+        <p:nvCxnSpPr>
+          <p:cNvPr id="107" name="Straight Arrow Connector 7"/>
+          <p:cNvCxnSpPr>
+            <a:stCxn id="5" idx="2"/>
+            <a:endCxn id="3" idx="4"/>
+          </p:cNvCxnSpPr>
+          <p:nvPr/>
+        </p:nvCxnSpPr>
+        <p:spPr>
+          <a:xfrm rot="10800000">
+            <a:off x="2247900" y="2514600"/>
+            <a:ext cx="2400300" cy="1447800"/>
+          </a:xfrm>
+          <a:prstGeom prst="curvedConnector2">
+            <a:avLst/>
+          </a:prstGeom>
+          <a:ln w="25400">
+            <a:solidFill>
+              <a:schemeClr val="tx1"/>
+            </a:solidFill>
+            <a:tailEnd type="arrow"/>
+          </a:ln>
+        </p:spPr>
+        <p:style>
+          <a:lnRef idx="1">
+            <a:schemeClr val="accent1"/>
+          </a:lnRef>
+          <a:fillRef idx="0">
+            <a:schemeClr val="accent1"/>
+          </a:fillRef>
+          <a:effectRef idx="0">
+            <a:schemeClr val="accent1"/>
+          </a:effectRef>
+          <a:fontRef idx="minor">
+            <a:schemeClr val="tx1"/>
+          </a:fontRef>
+        </p:style>
+      </p:cxnSp>
+      <p:sp>
+        <p:nvSpPr>
+          <p:cNvPr id="110" name="TextBox 109"/>
+          <p:cNvSpPr txBox="1"/>
+          <p:nvPr/>
+        </p:nvSpPr>
+        <p:spPr>
+          <a:xfrm>
+            <a:off x="2057400" y="3276600"/>
+            <a:ext cx="914400" cy="646331"/>
+          </a:xfrm>
+          <a:prstGeom prst="rect">
+            <a:avLst/>
+          </a:prstGeom>
+          <a:noFill/>
+        </p:spPr>
+        <p:txBody>
+          <a:bodyPr wrap="square" rtlCol="0">
+            <a:spAutoFit/>
+          </a:bodyPr>
+          <a:lstStyle/>
+          <a:p>
+            <a:r>
+              <a:rPr lang="en-US" sz="1200" dirty="0" smtClean="0"/>
+              <a:t>End Document</a:t>
+            </a:r>
+          </a:p>
+          <a:p>
+            <a:r>
+              <a:rPr lang="en-US" sz="1200" dirty="0" smtClean="0"/>
+              <a:t>[</a:t>
+            </a:r>
+            <a:r>
+              <a:rPr lang="en-US" sz="1200" b="1" dirty="0" smtClean="0"/>
+              <a:t>Done</a:t>
+            </a:r>
+            <a:r>
+              <a:rPr lang="en-US" sz="1200" dirty="0" smtClean="0"/>
+              <a:t>]</a:t>
+            </a:r>
+            <a:endParaRPr lang="en-US" sz="1200" dirty="0"/>
+          </a:p>
+        </p:txBody>
+      </p:sp>
+    </p:spTree>
+  </p:cSld>
+  <p:clrMapOvr>
+    <a:masterClrMapping/>
+  </p:clrMapOvr>
+</p:sld>
+</file>
+
+<file path=ppt/slides/slide3.xml><?xml version="1.0" encoding="utf-8"?>
+<p:sld xmlns:a="http://schemas.openxmlformats.org/drawingml/2006/main" xmlns:r="http://schemas.openxmlformats.org/officeDocument/2006/relationships" xmlns:p="http://schemas.openxmlformats.org/presentationml/2006/main">
+  <p:cSld>
+    <p:spTree>
+      <p:nvGrpSpPr>
+        <p:cNvPr id="1" name=""/>
+        <p:cNvGrpSpPr/>
+        <p:nvPr/>
+      </p:nvGrpSpPr>
+      <p:grpSpPr>
+        <a:xfrm>
+          <a:off x="0" y="0"/>
+          <a:ext cx="0" cy="0"/>
+          <a:chOff x="0" y="0"/>
+          <a:chExt cx="0" cy="0"/>
+        </a:xfrm>
+      </p:grpSpPr>
+      <p:sp>
+        <p:nvSpPr>
+          <p:cNvPr id="2" name="Title 1"/>
+          <p:cNvSpPr>
+            <a:spLocks noGrp="1"/>
+          </p:cNvSpPr>
+          <p:nvPr>
+            <p:ph type="title"/>
+          </p:nvPr>
+        </p:nvSpPr>
+        <p:spPr/>
+        <p:txBody>
+          <a:bodyPr/>
+          <a:lstStyle/>
+          <a:p>
+            <a:r>
+              <a:rPr lang="en-US" dirty="0" smtClean="0"/>
+              <a:t>Build Object</a:t>
+            </a:r>
+            <a:endParaRPr lang="en-US" dirty="0"/>
+          </a:p>
+        </p:txBody>
+      </p:sp>
+      <p:sp>
+        <p:nvSpPr>
+          <p:cNvPr id="3" name="Oval 2"/>
+          <p:cNvSpPr/>
+          <p:nvPr/>
+        </p:nvSpPr>
+        <p:spPr>
+          <a:xfrm>
+            <a:off x="1676400" y="1981200"/>
+            <a:ext cx="1295400" cy="609600"/>
+          </a:xfrm>
+          <a:prstGeom prst="ellipse">
+            <a:avLst/>
+          </a:prstGeom>
+          <a:solidFill>
+            <a:schemeClr val="bg1"/>
+          </a:solidFill>
+          <a:ln>
+            <a:solidFill>
+              <a:schemeClr val="tx1"/>
+            </a:solidFill>
+          </a:ln>
+        </p:spPr>
+        <p:style>
+          <a:lnRef idx="2">
+            <a:schemeClr val="accent1">
+              <a:shade val="50000"/>
+            </a:schemeClr>
+          </a:lnRef>
+          <a:fillRef idx="1">
+            <a:schemeClr val="accent1"/>
+          </a:fillRef>
+          <a:effectRef idx="0">
+            <a:schemeClr val="accent1"/>
+          </a:effectRef>
+          <a:fontRef idx="minor">
+            <a:schemeClr val="lt1"/>
+          </a:fontRef>
+        </p:style>
+        <p:txBody>
+          <a:bodyPr rtlCol="0" anchor="ctr"/>
+          <a:lstStyle/>
+          <a:p>
+            <a:pPr algn="ctr"/>
+            <a:r>
+              <a:rPr lang="en-US" sz="1200" dirty="0" smtClean="0">
+                <a:solidFill>
+                  <a:schemeClr val="tx1"/>
+                </a:solidFill>
+              </a:rPr>
+              <a:t>Awaiting Root Start</a:t>
+            </a:r>
+            <a:endParaRPr lang="en-US" dirty="0">
+              <a:solidFill>
+                <a:schemeClr val="tx1"/>
+              </a:solidFill>
+            </a:endParaRPr>
+          </a:p>
+        </p:txBody>
+      </p:sp>
+      <p:cxnSp>
+        <p:nvCxnSpPr>
+          <p:cNvPr id="4" name="Straight Arrow Connector 7"/>
+          <p:cNvCxnSpPr>
+            <a:stCxn id="3" idx="7"/>
+            <a:endCxn id="6" idx="1"/>
+          </p:cNvCxnSpPr>
+          <p:nvPr/>
+        </p:nvCxnSpPr>
+        <p:spPr>
+          <a:xfrm rot="16200000" flipH="1">
+            <a:off x="3276600" y="1575967"/>
+            <a:ext cx="381000" cy="1370014"/>
+          </a:xfrm>
+          <a:prstGeom prst="curvedConnector3">
+            <a:avLst>
+              <a:gd name="adj1" fmla="val -83431"/>
+            </a:avLst>
+          </a:prstGeom>
+          <a:ln w="25400">
+            <a:solidFill>
+              <a:schemeClr val="tx1"/>
+            </a:solidFill>
+            <a:tailEnd type="arrow"/>
+          </a:ln>
+        </p:spPr>
+        <p:style>
+          <a:lnRef idx="1">
+            <a:schemeClr val="accent1"/>
+          </a:lnRef>
+          <a:fillRef idx="0">
+            <a:schemeClr val="accent1"/>
+          </a:fillRef>
+          <a:effectRef idx="0">
+            <a:schemeClr val="accent1"/>
+          </a:effectRef>
+          <a:fontRef idx="minor">
+            <a:schemeClr val="tx1"/>
+          </a:fontRef>
+        </p:style>
+      </p:cxnSp>
+      <p:sp>
+        <p:nvSpPr>
+          <p:cNvPr id="5" name="Rectangle 4"/>
+          <p:cNvSpPr/>
+          <p:nvPr/>
+        </p:nvSpPr>
+        <p:spPr>
+          <a:xfrm>
+            <a:off x="3810000" y="1676400"/>
+            <a:ext cx="812851" cy="276999"/>
+          </a:xfrm>
+          <a:prstGeom prst="rect">
+            <a:avLst/>
+          </a:prstGeom>
+        </p:spPr>
+        <p:txBody>
+          <a:bodyPr wrap="none">
+            <a:spAutoFit/>
+          </a:bodyPr>
+          <a:lstStyle/>
+          <a:p>
+            <a:r>
+              <a:rPr lang="en-US" sz="1200" dirty="0" smtClean="0"/>
+              <a:t>Root Start</a:t>
+            </a:r>
+            <a:endParaRPr lang="en-US" sz="1200" dirty="0"/>
+          </a:p>
+        </p:txBody>
+      </p:sp>
+      <p:sp>
+        <p:nvSpPr>
+          <p:cNvPr id="6" name="Oval 5"/>
+          <p:cNvSpPr/>
+          <p:nvPr/>
+        </p:nvSpPr>
+        <p:spPr>
+          <a:xfrm>
+            <a:off x="3962400" y="2362200"/>
+            <a:ext cx="1295400" cy="609600"/>
+          </a:xfrm>
+          <a:prstGeom prst="ellipse">
+            <a:avLst/>
+          </a:prstGeom>
+          <a:solidFill>
+            <a:schemeClr val="bg1"/>
+          </a:solidFill>
+          <a:ln>
+            <a:solidFill>
+              <a:schemeClr val="tx1"/>
+            </a:solidFill>
+          </a:ln>
+        </p:spPr>
+        <p:style>
+          <a:lnRef idx="2">
+            <a:schemeClr val="accent1">
+              <a:shade val="50000"/>
+            </a:schemeClr>
+          </a:lnRef>
+          <a:fillRef idx="1">
+            <a:schemeClr val="accent1"/>
+          </a:fillRef>
+          <a:effectRef idx="0">
+            <a:schemeClr val="accent1"/>
+          </a:effectRef>
+          <a:fontRef idx="minor">
+            <a:schemeClr val="lt1"/>
+          </a:fontRef>
+        </p:style>
+        <p:txBody>
+          <a:bodyPr rtlCol="0" anchor="ctr"/>
+          <a:lstStyle/>
+          <a:p>
+            <a:pPr algn="ctr"/>
+            <a:r>
+              <a:rPr lang="en-US" sz="1200" dirty="0" smtClean="0">
+                <a:solidFill>
+                  <a:schemeClr val="tx1"/>
+                </a:solidFill>
+              </a:rPr>
+              <a:t>Awaiting Entry Start</a:t>
+            </a:r>
+            <a:endParaRPr lang="en-US" dirty="0">
+              <a:solidFill>
+                <a:schemeClr val="tx1"/>
+              </a:solidFill>
+            </a:endParaRPr>
+          </a:p>
+        </p:txBody>
+      </p:sp>
+      <p:sp>
+        <p:nvSpPr>
+          <p:cNvPr id="8" name="Oval 7"/>
+          <p:cNvSpPr/>
+          <p:nvPr/>
+        </p:nvSpPr>
+        <p:spPr>
+          <a:xfrm>
+            <a:off x="5562600" y="3429000"/>
+            <a:ext cx="1295400" cy="609600"/>
+          </a:xfrm>
+          <a:prstGeom prst="ellipse">
+            <a:avLst/>
+          </a:prstGeom>
+          <a:solidFill>
+            <a:schemeClr val="bg1"/>
+          </a:solidFill>
+          <a:ln>
+            <a:solidFill>
+              <a:schemeClr val="tx1"/>
+            </a:solidFill>
+          </a:ln>
+        </p:spPr>
+        <p:style>
+          <a:lnRef idx="2">
+            <a:schemeClr val="accent1">
+              <a:shade val="50000"/>
+            </a:schemeClr>
+          </a:lnRef>
+          <a:fillRef idx="1">
+            <a:schemeClr val="accent1"/>
+          </a:fillRef>
+          <a:effectRef idx="0">
+            <a:schemeClr val="accent1"/>
+          </a:effectRef>
+          <a:fontRef idx="minor">
+            <a:schemeClr val="lt1"/>
+          </a:fontRef>
+        </p:style>
+        <p:txBody>
+          <a:bodyPr rtlCol="0" anchor="ctr"/>
+          <a:lstStyle/>
+          <a:p>
+            <a:pPr algn="ctr"/>
+            <a:r>
+              <a:rPr lang="en-US" sz="1200" dirty="0" smtClean="0">
+                <a:solidFill>
+                  <a:schemeClr val="tx1"/>
+                </a:solidFill>
+              </a:rPr>
+              <a:t>Awaiting Entry Start</a:t>
+            </a:r>
+            <a:endParaRPr lang="en-US" dirty="0">
+              <a:solidFill>
+                <a:schemeClr val="tx1"/>
+              </a:solidFill>
+            </a:endParaRPr>
+          </a:p>
+        </p:txBody>
+      </p:sp>
+      <p:cxnSp>
+        <p:nvCxnSpPr>
+          <p:cNvPr id="9" name="Straight Arrow Connector 7"/>
+          <p:cNvCxnSpPr>
+            <a:stCxn id="6" idx="6"/>
+            <a:endCxn id="8" idx="0"/>
+          </p:cNvCxnSpPr>
+          <p:nvPr/>
+        </p:nvCxnSpPr>
+        <p:spPr>
+          <a:xfrm>
+            <a:off x="5257800" y="2667000"/>
+            <a:ext cx="952500" cy="762000"/>
+          </a:xfrm>
+          <a:prstGeom prst="curvedConnector2">
+            <a:avLst/>
+          </a:prstGeom>
+          <a:ln w="25400">
+            <a:solidFill>
+              <a:schemeClr val="tx1"/>
+            </a:solidFill>
+            <a:tailEnd type="arrow"/>
+          </a:ln>
+        </p:spPr>
+        <p:style>
+          <a:lnRef idx="1">
+            <a:schemeClr val="accent1"/>
+          </a:lnRef>
+          <a:fillRef idx="0">
+            <a:schemeClr val="accent1"/>
+          </a:fillRef>
+          <a:effectRef idx="0">
+            <a:schemeClr val="accent1"/>
+          </a:effectRef>
+          <a:fontRef idx="minor">
+            <a:schemeClr val="tx1"/>
+          </a:fontRef>
+        </p:style>
+      </p:cxnSp>
+      <p:sp>
+        <p:nvSpPr>
+          <p:cNvPr id="12" name="Rectangle 11"/>
+          <p:cNvSpPr/>
+          <p:nvPr/>
+        </p:nvSpPr>
+        <p:spPr>
+          <a:xfrm>
+            <a:off x="5715000" y="2514600"/>
+            <a:ext cx="878702" cy="276999"/>
+          </a:xfrm>
+          <a:prstGeom prst="rect">
+            <a:avLst/>
+          </a:prstGeom>
+        </p:spPr>
+        <p:txBody>
+          <a:bodyPr wrap="none">
+            <a:spAutoFit/>
+          </a:bodyPr>
+          <a:lstStyle/>
+          <a:p>
+            <a:r>
+              <a:rPr lang="en-US" sz="1200" dirty="0" smtClean="0"/>
+              <a:t>Entity Start</a:t>
+            </a:r>
+            <a:endParaRPr lang="en-US" sz="1200" dirty="0"/>
+          </a:p>
+        </p:txBody>
+      </p:sp>
+      <p:cxnSp>
+        <p:nvCxnSpPr>
+          <p:cNvPr id="13" name="Straight Arrow Connector 7"/>
+          <p:cNvCxnSpPr>
+            <a:stCxn id="8" idx="6"/>
+            <a:endCxn id="8" idx="7"/>
+          </p:cNvCxnSpPr>
+          <p:nvPr/>
+        </p:nvCxnSpPr>
+        <p:spPr>
+          <a:xfrm flipH="1" flipV="1">
+            <a:off x="6668293" y="3518274"/>
+            <a:ext cx="189707" cy="215526"/>
+          </a:xfrm>
+          <a:prstGeom prst="curvedConnector4">
+            <a:avLst>
+              <a:gd name="adj1" fmla="val -120502"/>
+              <a:gd name="adj2" fmla="val 247488"/>
+            </a:avLst>
+          </a:prstGeom>
+          <a:ln w="25400">
+            <a:solidFill>
+              <a:schemeClr val="tx1"/>
+            </a:solidFill>
+            <a:tailEnd type="arrow"/>
+          </a:ln>
+        </p:spPr>
+        <p:style>
+          <a:lnRef idx="1">
+            <a:schemeClr val="accent1"/>
+          </a:lnRef>
+          <a:fillRef idx="0">
+            <a:schemeClr val="accent1"/>
+          </a:fillRef>
+          <a:effectRef idx="0">
+            <a:schemeClr val="accent1"/>
+          </a:effectRef>
+          <a:fontRef idx="minor">
+            <a:schemeClr val="tx1"/>
+          </a:fontRef>
+        </p:style>
+      </p:cxnSp>
+      <p:sp>
+        <p:nvSpPr>
+          <p:cNvPr id="16" name="Rectangle 15"/>
+          <p:cNvSpPr/>
+          <p:nvPr/>
+        </p:nvSpPr>
+        <p:spPr>
+          <a:xfrm>
+            <a:off x="6705600" y="2895600"/>
+            <a:ext cx="1308307" cy="276999"/>
+          </a:xfrm>
+          <a:prstGeom prst="rect">
+            <a:avLst/>
+          </a:prstGeom>
+        </p:spPr>
+        <p:txBody>
+          <a:bodyPr wrap="none">
+            <a:spAutoFit/>
+          </a:bodyPr>
+          <a:lstStyle/>
+          <a:p>
+            <a:r>
+              <a:rPr lang="en-US" sz="1200" dirty="0" smtClean="0"/>
+              <a:t>Entity Start (push)</a:t>
+            </a:r>
+            <a:endParaRPr lang="en-US" sz="1200" dirty="0"/>
+          </a:p>
+        </p:txBody>
+      </p:sp>
+      <p:sp>
+        <p:nvSpPr>
+          <p:cNvPr id="17" name="Rectangle 16"/>
+          <p:cNvSpPr/>
+          <p:nvPr/>
+        </p:nvSpPr>
+        <p:spPr>
+          <a:xfrm>
+            <a:off x="4495800" y="4267200"/>
+            <a:ext cx="1347869" cy="276999"/>
+          </a:xfrm>
+          <a:prstGeom prst="rect">
+            <a:avLst/>
+          </a:prstGeom>
+        </p:spPr>
+        <p:txBody>
+          <a:bodyPr wrap="none">
+            <a:spAutoFit/>
+          </a:bodyPr>
+          <a:lstStyle/>
+          <a:p>
+            <a:r>
+              <a:rPr lang="en-US" sz="1200" dirty="0" smtClean="0"/>
+              <a:t>Object Value (pop)</a:t>
+            </a:r>
+            <a:endParaRPr lang="en-US" sz="1200" dirty="0"/>
+          </a:p>
+        </p:txBody>
+      </p:sp>
+      <p:cxnSp>
+        <p:nvCxnSpPr>
+          <p:cNvPr id="20" name="Straight Arrow Connector 7"/>
+          <p:cNvCxnSpPr>
+            <a:stCxn id="8" idx="2"/>
+            <a:endCxn id="6" idx="4"/>
+          </p:cNvCxnSpPr>
+          <p:nvPr/>
+        </p:nvCxnSpPr>
+        <p:spPr>
+          <a:xfrm rot="10800000">
+            <a:off x="4610100" y="2971800"/>
+            <a:ext cx="952500" cy="762000"/>
+          </a:xfrm>
+          <a:prstGeom prst="curvedConnector2">
+            <a:avLst/>
+          </a:prstGeom>
+          <a:ln w="25400">
+            <a:solidFill>
+              <a:schemeClr val="tx1"/>
+            </a:solidFill>
+            <a:tailEnd type="arrow"/>
+          </a:ln>
+        </p:spPr>
+        <p:style>
+          <a:lnRef idx="1">
+            <a:schemeClr val="accent1"/>
+          </a:lnRef>
+          <a:fillRef idx="0">
+            <a:schemeClr val="accent1"/>
+          </a:fillRef>
+          <a:effectRef idx="0">
+            <a:schemeClr val="accent1"/>
+          </a:effectRef>
+          <a:fontRef idx="minor">
+            <a:schemeClr val="tx1"/>
+          </a:fontRef>
+        </p:style>
+      </p:cxnSp>
+      <p:cxnSp>
+        <p:nvCxnSpPr>
+          <p:cNvPr id="23" name="Straight Arrow Connector 7"/>
+          <p:cNvCxnSpPr>
+            <a:stCxn id="8" idx="3"/>
+            <a:endCxn id="6" idx="3"/>
+          </p:cNvCxnSpPr>
+          <p:nvPr/>
+        </p:nvCxnSpPr>
+        <p:spPr>
+          <a:xfrm rot="5400000" flipH="1">
+            <a:off x="4418807" y="2615826"/>
+            <a:ext cx="1066800" cy="1600200"/>
+          </a:xfrm>
+          <a:prstGeom prst="curvedConnector3">
+            <a:avLst>
+              <a:gd name="adj1" fmla="val -29797"/>
+            </a:avLst>
+          </a:prstGeom>
+          <a:ln w="25400">
+            <a:solidFill>
+              <a:schemeClr val="tx1"/>
+            </a:solidFill>
+            <a:tailEnd type="arrow"/>
+          </a:ln>
+        </p:spPr>
+        <p:style>
+          <a:lnRef idx="1">
+            <a:schemeClr val="accent1"/>
+          </a:lnRef>
+          <a:fillRef idx="0">
+            <a:schemeClr val="accent1"/>
+          </a:fillRef>
+          <a:effectRef idx="0">
+            <a:schemeClr val="accent1"/>
+          </a:effectRef>
+          <a:fontRef idx="minor">
+            <a:schemeClr val="tx1"/>
+          </a:fontRef>
+        </p:style>
+      </p:cxnSp>
+      <p:sp>
+        <p:nvSpPr>
+          <p:cNvPr id="28" name="Rectangle 27"/>
+          <p:cNvSpPr/>
+          <p:nvPr/>
+        </p:nvSpPr>
+        <p:spPr>
+          <a:xfrm>
+            <a:off x="4724400" y="3124200"/>
+            <a:ext cx="985591" cy="276999"/>
+          </a:xfrm>
+          <a:prstGeom prst="rect">
+            <a:avLst/>
+          </a:prstGeom>
+        </p:spPr>
+        <p:txBody>
+          <a:bodyPr wrap="none">
+            <a:spAutoFit/>
+          </a:bodyPr>
+          <a:lstStyle/>
+          <a:p>
+            <a:r>
+              <a:rPr lang="en-US" sz="1200" dirty="0" smtClean="0"/>
+              <a:t>Simple Value</a:t>
+            </a:r>
+            <a:endParaRPr lang="en-US" sz="1200" dirty="0"/>
+          </a:p>
+        </p:txBody>
+      </p:sp>
+      <p:cxnSp>
+        <p:nvCxnSpPr>
+          <p:cNvPr id="34" name="Straight Arrow Connector 7"/>
+          <p:cNvCxnSpPr>
+            <a:stCxn id="6" idx="2"/>
+            <a:endCxn id="3" idx="6"/>
+          </p:cNvCxnSpPr>
+          <p:nvPr/>
+        </p:nvCxnSpPr>
+        <p:spPr>
+          <a:xfrm rot="10800000">
+            <a:off x="2971800" y="2286000"/>
+            <a:ext cx="990600" cy="381000"/>
+          </a:xfrm>
+          <a:prstGeom prst="curvedConnector3">
+            <a:avLst>
+              <a:gd name="adj1" fmla="val 50000"/>
+            </a:avLst>
+          </a:prstGeom>
+          <a:ln w="25400">
+            <a:solidFill>
+              <a:schemeClr val="tx1"/>
+            </a:solidFill>
+            <a:tailEnd type="arrow"/>
+          </a:ln>
+        </p:spPr>
+        <p:style>
+          <a:lnRef idx="1">
+            <a:schemeClr val="accent1"/>
+          </a:lnRef>
+          <a:fillRef idx="0">
+            <a:schemeClr val="accent1"/>
+          </a:fillRef>
+          <a:effectRef idx="0">
+            <a:schemeClr val="accent1"/>
+          </a:effectRef>
+          <a:fontRef idx="minor">
+            <a:schemeClr val="tx1"/>
+          </a:fontRef>
+        </p:style>
+      </p:cxnSp>
+      <p:sp>
+        <p:nvSpPr>
+          <p:cNvPr id="40" name="Rectangle 39"/>
+          <p:cNvSpPr/>
+          <p:nvPr/>
+        </p:nvSpPr>
+        <p:spPr>
+          <a:xfrm>
+            <a:off x="2895600" y="2590800"/>
+            <a:ext cx="812851" cy="276999"/>
+          </a:xfrm>
+          <a:prstGeom prst="rect">
+            <a:avLst/>
+          </a:prstGeom>
+        </p:spPr>
+        <p:txBody>
+          <a:bodyPr wrap="none">
+            <a:spAutoFit/>
+          </a:bodyPr>
+          <a:lstStyle/>
+          <a:p>
+            <a:r>
+              <a:rPr lang="en-US" sz="1200" dirty="0" smtClean="0"/>
+              <a:t>Root Start</a:t>
             </a:r>
             <a:endParaRPr lang="en-US" sz="1200" dirty="0"/>
           </a:p>

</xml_diff>

<commit_message>
Add some documentation for the state table and tweak some of the code to correct some minor things and comments.
</commit_message>
<xml_diff>
--- a/src/main/resources/StateTables.pptx
+++ b/src/main/resources/StateTables.pptx
@@ -6,8 +6,9 @@
   </p:sldMasterIdLst>
   <p:sldIdLst>
     <p:sldId id="256" r:id="rId2"/>
-    <p:sldId id="257" r:id="rId3"/>
-    <p:sldId id="258" r:id="rId4"/>
+    <p:sldId id="259" r:id="rId3"/>
+    <p:sldId id="257" r:id="rId4"/>
+    <p:sldId id="258" r:id="rId5"/>
   </p:sldIdLst>
   <p:sldSz cx="9144000" cy="6858000" type="screen4x3"/>
   <p:notesSz cx="6858000" cy="9144000"/>
@@ -291,7 +292,7 @@
             <a:fld id="{956D0292-F28F-4A70-A539-513257EB9152}" type="datetimeFigureOut">
               <a:rPr lang="en-US" smtClean="0"/>
               <a:pPr/>
-              <a:t>12/27/2016</a:t>
+              <a:t>6/11/2017</a:t>
             </a:fld>
             <a:endParaRPr lang="en-US"/>
           </a:p>
@@ -458,7 +459,7 @@
             <a:fld id="{956D0292-F28F-4A70-A539-513257EB9152}" type="datetimeFigureOut">
               <a:rPr lang="en-US" smtClean="0"/>
               <a:pPr/>
-              <a:t>12/27/2016</a:t>
+              <a:t>6/11/2017</a:t>
             </a:fld>
             <a:endParaRPr lang="en-US"/>
           </a:p>
@@ -635,7 +636,7 @@
             <a:fld id="{956D0292-F28F-4A70-A539-513257EB9152}" type="datetimeFigureOut">
               <a:rPr lang="en-US" smtClean="0"/>
               <a:pPr/>
-              <a:t>12/27/2016</a:t>
+              <a:t>6/11/2017</a:t>
             </a:fld>
             <a:endParaRPr lang="en-US"/>
           </a:p>
@@ -802,7 +803,7 @@
             <a:fld id="{956D0292-F28F-4A70-A539-513257EB9152}" type="datetimeFigureOut">
               <a:rPr lang="en-US" smtClean="0"/>
               <a:pPr/>
-              <a:t>12/27/2016</a:t>
+              <a:t>6/11/2017</a:t>
             </a:fld>
             <a:endParaRPr lang="en-US"/>
           </a:p>
@@ -1045,7 +1046,7 @@
             <a:fld id="{956D0292-F28F-4A70-A539-513257EB9152}" type="datetimeFigureOut">
               <a:rPr lang="en-US" smtClean="0"/>
               <a:pPr/>
-              <a:t>12/27/2016</a:t>
+              <a:t>6/11/2017</a:t>
             </a:fld>
             <a:endParaRPr lang="en-US"/>
           </a:p>
@@ -1330,7 +1331,7 @@
             <a:fld id="{956D0292-F28F-4A70-A539-513257EB9152}" type="datetimeFigureOut">
               <a:rPr lang="en-US" smtClean="0"/>
               <a:pPr/>
-              <a:t>12/27/2016</a:t>
+              <a:t>6/11/2017</a:t>
             </a:fld>
             <a:endParaRPr lang="en-US"/>
           </a:p>
@@ -1749,7 +1750,7 @@
             <a:fld id="{956D0292-F28F-4A70-A539-513257EB9152}" type="datetimeFigureOut">
               <a:rPr lang="en-US" smtClean="0"/>
               <a:pPr/>
-              <a:t>12/27/2016</a:t>
+              <a:t>6/11/2017</a:t>
             </a:fld>
             <a:endParaRPr lang="en-US"/>
           </a:p>
@@ -1864,7 +1865,7 @@
             <a:fld id="{956D0292-F28F-4A70-A539-513257EB9152}" type="datetimeFigureOut">
               <a:rPr lang="en-US" smtClean="0"/>
               <a:pPr/>
-              <a:t>12/27/2016</a:t>
+              <a:t>6/11/2017</a:t>
             </a:fld>
             <a:endParaRPr lang="en-US"/>
           </a:p>
@@ -1956,7 +1957,7 @@
             <a:fld id="{956D0292-F28F-4A70-A539-513257EB9152}" type="datetimeFigureOut">
               <a:rPr lang="en-US" smtClean="0"/>
               <a:pPr/>
-              <a:t>12/27/2016</a:t>
+              <a:t>6/11/2017</a:t>
             </a:fld>
             <a:endParaRPr lang="en-US"/>
           </a:p>
@@ -2230,7 +2231,7 @@
             <a:fld id="{956D0292-F28F-4A70-A539-513257EB9152}" type="datetimeFigureOut">
               <a:rPr lang="en-US" smtClean="0"/>
               <a:pPr/>
-              <a:t>12/27/2016</a:t>
+              <a:t>6/11/2017</a:t>
             </a:fld>
             <a:endParaRPr lang="en-US"/>
           </a:p>
@@ -2480,7 +2481,7 @@
             <a:fld id="{956D0292-F28F-4A70-A539-513257EB9152}" type="datetimeFigureOut">
               <a:rPr lang="en-US" smtClean="0"/>
               <a:pPr/>
-              <a:t>12/27/2016</a:t>
+              <a:t>6/11/2017</a:t>
             </a:fld>
             <a:endParaRPr lang="en-US"/>
           </a:p>
@@ -2690,7 +2691,7 @@
             <a:fld id="{956D0292-F28F-4A70-A539-513257EB9152}" type="datetimeFigureOut">
               <a:rPr lang="en-US" smtClean="0"/>
               <a:pPr/>
-              <a:t>12/27/2016</a:t>
+              <a:t>6/11/2017</a:t>
             </a:fld>
             <a:endParaRPr lang="en-US"/>
           </a:p>
@@ -3149,6 +3150,778 @@
           <a:p>
             <a:r>
               <a:rPr lang="en-US" dirty="0" smtClean="0"/>
+              <a:t>Turnstile</a:t>
+            </a:r>
+            <a:endParaRPr lang="en-US" dirty="0"/>
+          </a:p>
+        </p:txBody>
+      </p:sp>
+      <p:sp>
+        <p:nvSpPr>
+          <p:cNvPr id="3" name="Oval 2"/>
+          <p:cNvSpPr/>
+          <p:nvPr/>
+        </p:nvSpPr>
+        <p:spPr>
+          <a:xfrm>
+            <a:off x="1600200" y="1905000"/>
+            <a:ext cx="1295400" cy="609600"/>
+          </a:xfrm>
+          <a:prstGeom prst="ellipse">
+            <a:avLst/>
+          </a:prstGeom>
+          <a:solidFill>
+            <a:schemeClr val="bg1"/>
+          </a:solidFill>
+          <a:ln>
+            <a:solidFill>
+              <a:schemeClr val="tx1"/>
+            </a:solidFill>
+          </a:ln>
+        </p:spPr>
+        <p:style>
+          <a:lnRef idx="2">
+            <a:schemeClr val="accent1">
+              <a:shade val="50000"/>
+            </a:schemeClr>
+          </a:lnRef>
+          <a:fillRef idx="1">
+            <a:schemeClr val="accent1"/>
+          </a:fillRef>
+          <a:effectRef idx="0">
+            <a:schemeClr val="accent1"/>
+          </a:effectRef>
+          <a:fontRef idx="minor">
+            <a:schemeClr val="lt1"/>
+          </a:fontRef>
+        </p:style>
+        <p:txBody>
+          <a:bodyPr rtlCol="0" anchor="ctr"/>
+          <a:lstStyle/>
+          <a:p>
+            <a:pPr algn="ctr"/>
+            <a:r>
+              <a:rPr lang="en-US" sz="1200" b="1" dirty="0" smtClean="0">
+                <a:solidFill>
+                  <a:schemeClr val="tx1"/>
+                </a:solidFill>
+              </a:rPr>
+              <a:t>Off</a:t>
+            </a:r>
+            <a:endParaRPr lang="en-US" b="1" dirty="0">
+              <a:solidFill>
+                <a:schemeClr val="tx1"/>
+              </a:solidFill>
+            </a:endParaRPr>
+          </a:p>
+        </p:txBody>
+      </p:sp>
+      <p:sp>
+        <p:nvSpPr>
+          <p:cNvPr id="4" name="Oval 3"/>
+          <p:cNvSpPr/>
+          <p:nvPr/>
+        </p:nvSpPr>
+        <p:spPr>
+          <a:xfrm>
+            <a:off x="5105400" y="1752600"/>
+            <a:ext cx="1295400" cy="609600"/>
+          </a:xfrm>
+          <a:prstGeom prst="ellipse">
+            <a:avLst/>
+          </a:prstGeom>
+          <a:solidFill>
+            <a:schemeClr val="bg1"/>
+          </a:solidFill>
+          <a:ln>
+            <a:solidFill>
+              <a:schemeClr val="tx1"/>
+            </a:solidFill>
+          </a:ln>
+        </p:spPr>
+        <p:style>
+          <a:lnRef idx="2">
+            <a:schemeClr val="accent1">
+              <a:shade val="50000"/>
+            </a:schemeClr>
+          </a:lnRef>
+          <a:fillRef idx="1">
+            <a:schemeClr val="accent1"/>
+          </a:fillRef>
+          <a:effectRef idx="0">
+            <a:schemeClr val="accent1"/>
+          </a:effectRef>
+          <a:fontRef idx="minor">
+            <a:schemeClr val="lt1"/>
+          </a:fontRef>
+        </p:style>
+        <p:txBody>
+          <a:bodyPr rtlCol="0" anchor="ctr"/>
+          <a:lstStyle/>
+          <a:p>
+            <a:pPr algn="ctr"/>
+            <a:r>
+              <a:rPr lang="en-US" sz="1200" b="1" dirty="0" smtClean="0">
+                <a:solidFill>
+                  <a:schemeClr val="tx1"/>
+                </a:solidFill>
+              </a:rPr>
+              <a:t>Unlocked</a:t>
+            </a:r>
+            <a:endParaRPr lang="en-US" b="1" dirty="0">
+              <a:solidFill>
+                <a:schemeClr val="tx1"/>
+              </a:solidFill>
+            </a:endParaRPr>
+          </a:p>
+        </p:txBody>
+      </p:sp>
+      <p:sp>
+        <p:nvSpPr>
+          <p:cNvPr id="5" name="Oval 4"/>
+          <p:cNvSpPr/>
+          <p:nvPr/>
+        </p:nvSpPr>
+        <p:spPr>
+          <a:xfrm>
+            <a:off x="2743200" y="2971800"/>
+            <a:ext cx="1295400" cy="609600"/>
+          </a:xfrm>
+          <a:prstGeom prst="ellipse">
+            <a:avLst/>
+          </a:prstGeom>
+          <a:solidFill>
+            <a:schemeClr val="bg1"/>
+          </a:solidFill>
+          <a:ln>
+            <a:solidFill>
+              <a:schemeClr val="tx1"/>
+            </a:solidFill>
+          </a:ln>
+        </p:spPr>
+        <p:style>
+          <a:lnRef idx="2">
+            <a:schemeClr val="accent1">
+              <a:shade val="50000"/>
+            </a:schemeClr>
+          </a:lnRef>
+          <a:fillRef idx="1">
+            <a:schemeClr val="accent1"/>
+          </a:fillRef>
+          <a:effectRef idx="0">
+            <a:schemeClr val="accent1"/>
+          </a:effectRef>
+          <a:fontRef idx="minor">
+            <a:schemeClr val="lt1"/>
+          </a:fontRef>
+        </p:style>
+        <p:txBody>
+          <a:bodyPr rtlCol="0" anchor="ctr"/>
+          <a:lstStyle/>
+          <a:p>
+            <a:pPr algn="ctr"/>
+            <a:r>
+              <a:rPr lang="en-US" sz="1200" b="1" dirty="0" smtClean="0">
+                <a:solidFill>
+                  <a:schemeClr val="tx1"/>
+                </a:solidFill>
+              </a:rPr>
+              <a:t>Locked</a:t>
+            </a:r>
+            <a:endParaRPr lang="en-US" b="1" dirty="0">
+              <a:solidFill>
+                <a:schemeClr val="tx1"/>
+              </a:solidFill>
+            </a:endParaRPr>
+          </a:p>
+        </p:txBody>
+      </p:sp>
+      <p:cxnSp>
+        <p:nvCxnSpPr>
+          <p:cNvPr id="6" name="Straight Arrow Connector 7"/>
+          <p:cNvCxnSpPr>
+            <a:stCxn id="3" idx="4"/>
+            <a:endCxn id="5" idx="2"/>
+          </p:cNvCxnSpPr>
+          <p:nvPr/>
+        </p:nvCxnSpPr>
+        <p:spPr>
+          <a:xfrm rot="16200000" flipH="1">
+            <a:off x="2114550" y="2647950"/>
+            <a:ext cx="762000" cy="495300"/>
+          </a:xfrm>
+          <a:prstGeom prst="curvedConnector2">
+            <a:avLst/>
+          </a:prstGeom>
+          <a:ln w="25400">
+            <a:solidFill>
+              <a:schemeClr val="tx1"/>
+            </a:solidFill>
+            <a:tailEnd type="arrow"/>
+          </a:ln>
+        </p:spPr>
+        <p:style>
+          <a:lnRef idx="1">
+            <a:schemeClr val="accent1"/>
+          </a:lnRef>
+          <a:fillRef idx="0">
+            <a:schemeClr val="accent1"/>
+          </a:fillRef>
+          <a:effectRef idx="0">
+            <a:schemeClr val="accent1"/>
+          </a:effectRef>
+          <a:fontRef idx="minor">
+            <a:schemeClr val="tx1"/>
+          </a:fontRef>
+        </p:style>
+      </p:cxnSp>
+      <p:sp>
+        <p:nvSpPr>
+          <p:cNvPr id="10" name="TextBox 9"/>
+          <p:cNvSpPr txBox="1"/>
+          <p:nvPr/>
+        </p:nvSpPr>
+        <p:spPr>
+          <a:xfrm>
+            <a:off x="1981200" y="2895600"/>
+            <a:ext cx="457200" cy="276999"/>
+          </a:xfrm>
+          <a:prstGeom prst="rect">
+            <a:avLst/>
+          </a:prstGeom>
+          <a:noFill/>
+        </p:spPr>
+        <p:txBody>
+          <a:bodyPr wrap="square" rtlCol="0">
+            <a:spAutoFit/>
+          </a:bodyPr>
+          <a:lstStyle/>
+          <a:p>
+            <a:r>
+              <a:rPr lang="en-US" sz="1200" dirty="0" smtClean="0"/>
+              <a:t>On</a:t>
+            </a:r>
+            <a:endParaRPr lang="en-US" sz="1200" dirty="0"/>
+          </a:p>
+        </p:txBody>
+      </p:sp>
+      <p:cxnSp>
+        <p:nvCxnSpPr>
+          <p:cNvPr id="12" name="Straight Arrow Connector 7"/>
+          <p:cNvCxnSpPr>
+            <a:stCxn id="3" idx="1"/>
+            <a:endCxn id="3" idx="2"/>
+          </p:cNvCxnSpPr>
+          <p:nvPr/>
+        </p:nvCxnSpPr>
+        <p:spPr>
+          <a:xfrm rot="16200000" flipH="1" flipV="1">
+            <a:off x="1587291" y="2007183"/>
+            <a:ext cx="215526" cy="189707"/>
+          </a:xfrm>
+          <a:prstGeom prst="curvedConnector4">
+            <a:avLst>
+              <a:gd name="adj1" fmla="val -147488"/>
+              <a:gd name="adj2" fmla="val 220502"/>
+            </a:avLst>
+          </a:prstGeom>
+          <a:ln w="25400">
+            <a:solidFill>
+              <a:schemeClr val="tx1"/>
+            </a:solidFill>
+            <a:tailEnd type="arrow"/>
+          </a:ln>
+        </p:spPr>
+        <p:style>
+          <a:lnRef idx="1">
+            <a:schemeClr val="accent1"/>
+          </a:lnRef>
+          <a:fillRef idx="0">
+            <a:schemeClr val="accent1"/>
+          </a:fillRef>
+          <a:effectRef idx="0">
+            <a:schemeClr val="accent1"/>
+          </a:effectRef>
+          <a:fontRef idx="minor">
+            <a:schemeClr val="tx1"/>
+          </a:fontRef>
+        </p:style>
+      </p:cxnSp>
+      <p:cxnSp>
+        <p:nvCxnSpPr>
+          <p:cNvPr id="15" name="Straight Arrow Connector 7"/>
+          <p:cNvCxnSpPr>
+            <a:stCxn id="5" idx="6"/>
+            <a:endCxn id="4" idx="4"/>
+          </p:cNvCxnSpPr>
+          <p:nvPr/>
+        </p:nvCxnSpPr>
+        <p:spPr>
+          <a:xfrm flipV="1">
+            <a:off x="4038600" y="2362200"/>
+            <a:ext cx="1714500" cy="914400"/>
+          </a:xfrm>
+          <a:prstGeom prst="curvedConnector2">
+            <a:avLst/>
+          </a:prstGeom>
+          <a:ln w="25400">
+            <a:solidFill>
+              <a:schemeClr val="tx1"/>
+            </a:solidFill>
+            <a:tailEnd type="arrow"/>
+          </a:ln>
+        </p:spPr>
+        <p:style>
+          <a:lnRef idx="1">
+            <a:schemeClr val="accent1"/>
+          </a:lnRef>
+          <a:fillRef idx="0">
+            <a:schemeClr val="accent1"/>
+          </a:fillRef>
+          <a:effectRef idx="0">
+            <a:schemeClr val="accent1"/>
+          </a:effectRef>
+          <a:fontRef idx="minor">
+            <a:schemeClr val="tx1"/>
+          </a:fontRef>
+        </p:style>
+      </p:cxnSp>
+      <p:sp>
+        <p:nvSpPr>
+          <p:cNvPr id="20" name="TextBox 19"/>
+          <p:cNvSpPr txBox="1"/>
+          <p:nvPr/>
+        </p:nvSpPr>
+        <p:spPr>
+          <a:xfrm>
+            <a:off x="5410200" y="2743200"/>
+            <a:ext cx="1676400" cy="461665"/>
+          </a:xfrm>
+          <a:prstGeom prst="rect">
+            <a:avLst/>
+          </a:prstGeom>
+          <a:noFill/>
+        </p:spPr>
+        <p:txBody>
+          <a:bodyPr wrap="square" rtlCol="0">
+            <a:spAutoFit/>
+          </a:bodyPr>
+          <a:lstStyle/>
+          <a:p>
+            <a:r>
+              <a:rPr lang="en-US" sz="1200" dirty="0" smtClean="0"/>
+              <a:t>Ticket</a:t>
+            </a:r>
+            <a:endParaRPr lang="en-US" sz="1200" dirty="0" smtClean="0"/>
+          </a:p>
+          <a:p>
+            <a:r>
+              <a:rPr lang="en-US" sz="1200" dirty="0" smtClean="0"/>
+              <a:t>[Increment Count]</a:t>
+            </a:r>
+            <a:endParaRPr lang="en-US" sz="1200" dirty="0"/>
+          </a:p>
+        </p:txBody>
+      </p:sp>
+      <p:cxnSp>
+        <p:nvCxnSpPr>
+          <p:cNvPr id="21" name="Straight Arrow Connector 7"/>
+          <p:cNvCxnSpPr>
+            <a:stCxn id="5" idx="3"/>
+            <a:endCxn id="5" idx="4"/>
+          </p:cNvCxnSpPr>
+          <p:nvPr/>
+        </p:nvCxnSpPr>
+        <p:spPr>
+          <a:xfrm rot="16200000" flipH="1">
+            <a:off x="3117266" y="3307766"/>
+            <a:ext cx="89274" cy="457993"/>
+          </a:xfrm>
+          <a:prstGeom prst="curvedConnector3">
+            <a:avLst>
+              <a:gd name="adj1" fmla="val 356066"/>
+            </a:avLst>
+          </a:prstGeom>
+          <a:ln w="25400">
+            <a:solidFill>
+              <a:schemeClr val="tx1"/>
+            </a:solidFill>
+            <a:tailEnd type="arrow"/>
+          </a:ln>
+        </p:spPr>
+        <p:style>
+          <a:lnRef idx="1">
+            <a:schemeClr val="accent1"/>
+          </a:lnRef>
+          <a:fillRef idx="0">
+            <a:schemeClr val="accent1"/>
+          </a:fillRef>
+          <a:effectRef idx="0">
+            <a:schemeClr val="accent1"/>
+          </a:effectRef>
+          <a:fontRef idx="minor">
+            <a:schemeClr val="tx1"/>
+          </a:fontRef>
+        </p:style>
+      </p:cxnSp>
+      <p:sp>
+        <p:nvSpPr>
+          <p:cNvPr id="24" name="TextBox 23"/>
+          <p:cNvSpPr txBox="1"/>
+          <p:nvPr/>
+        </p:nvSpPr>
+        <p:spPr>
+          <a:xfrm>
+            <a:off x="2895600" y="3761601"/>
+            <a:ext cx="685800" cy="276999"/>
+          </a:xfrm>
+          <a:prstGeom prst="rect">
+            <a:avLst/>
+          </a:prstGeom>
+          <a:noFill/>
+        </p:spPr>
+        <p:txBody>
+          <a:bodyPr wrap="square" rtlCol="0">
+            <a:spAutoFit/>
+          </a:bodyPr>
+          <a:lstStyle/>
+          <a:p>
+            <a:r>
+              <a:rPr lang="en-US" sz="1200" dirty="0" smtClean="0"/>
+              <a:t>Push</a:t>
+            </a:r>
+            <a:endParaRPr lang="en-US" sz="1200" dirty="0"/>
+          </a:p>
+        </p:txBody>
+      </p:sp>
+      <p:cxnSp>
+        <p:nvCxnSpPr>
+          <p:cNvPr id="25" name="Straight Arrow Connector 7"/>
+          <p:cNvCxnSpPr>
+            <a:stCxn id="5" idx="0"/>
+            <a:endCxn id="3" idx="6"/>
+          </p:cNvCxnSpPr>
+          <p:nvPr/>
+        </p:nvCxnSpPr>
+        <p:spPr>
+          <a:xfrm rot="16200000" flipV="1">
+            <a:off x="2762250" y="2343150"/>
+            <a:ext cx="762000" cy="495300"/>
+          </a:xfrm>
+          <a:prstGeom prst="curvedConnector2">
+            <a:avLst/>
+          </a:prstGeom>
+          <a:ln w="25400">
+            <a:solidFill>
+              <a:schemeClr val="tx1"/>
+            </a:solidFill>
+            <a:tailEnd type="arrow"/>
+          </a:ln>
+        </p:spPr>
+        <p:style>
+          <a:lnRef idx="1">
+            <a:schemeClr val="accent1"/>
+          </a:lnRef>
+          <a:fillRef idx="0">
+            <a:schemeClr val="accent1"/>
+          </a:fillRef>
+          <a:effectRef idx="0">
+            <a:schemeClr val="accent1"/>
+          </a:effectRef>
+          <a:fontRef idx="minor">
+            <a:schemeClr val="tx1"/>
+          </a:fontRef>
+        </p:style>
+      </p:cxnSp>
+      <p:sp>
+        <p:nvSpPr>
+          <p:cNvPr id="28" name="TextBox 27"/>
+          <p:cNvSpPr txBox="1"/>
+          <p:nvPr/>
+        </p:nvSpPr>
+        <p:spPr>
+          <a:xfrm>
+            <a:off x="2895600" y="1905000"/>
+            <a:ext cx="685800" cy="276999"/>
+          </a:xfrm>
+          <a:prstGeom prst="rect">
+            <a:avLst/>
+          </a:prstGeom>
+          <a:noFill/>
+        </p:spPr>
+        <p:txBody>
+          <a:bodyPr wrap="square" rtlCol="0">
+            <a:spAutoFit/>
+          </a:bodyPr>
+          <a:lstStyle/>
+          <a:p>
+            <a:r>
+              <a:rPr lang="en-US" sz="1200" dirty="0" smtClean="0"/>
+              <a:t>Off</a:t>
+            </a:r>
+            <a:endParaRPr lang="en-US" sz="1200" dirty="0"/>
+          </a:p>
+        </p:txBody>
+      </p:sp>
+      <p:cxnSp>
+        <p:nvCxnSpPr>
+          <p:cNvPr id="29" name="Straight Arrow Connector 7"/>
+          <p:cNvCxnSpPr>
+            <a:stCxn id="4" idx="6"/>
+            <a:endCxn id="4" idx="7"/>
+          </p:cNvCxnSpPr>
+          <p:nvPr/>
+        </p:nvCxnSpPr>
+        <p:spPr>
+          <a:xfrm flipH="1" flipV="1">
+            <a:off x="6211093" y="1841874"/>
+            <a:ext cx="189707" cy="215526"/>
+          </a:xfrm>
+          <a:prstGeom prst="curvedConnector4">
+            <a:avLst>
+              <a:gd name="adj1" fmla="val -120502"/>
+              <a:gd name="adj2" fmla="val 247488"/>
+            </a:avLst>
+          </a:prstGeom>
+          <a:ln w="25400">
+            <a:solidFill>
+              <a:schemeClr val="tx1"/>
+            </a:solidFill>
+            <a:tailEnd type="arrow"/>
+          </a:ln>
+        </p:spPr>
+        <p:style>
+          <a:lnRef idx="1">
+            <a:schemeClr val="accent1"/>
+          </a:lnRef>
+          <a:fillRef idx="0">
+            <a:schemeClr val="accent1"/>
+          </a:fillRef>
+          <a:effectRef idx="0">
+            <a:schemeClr val="accent1"/>
+          </a:effectRef>
+          <a:fontRef idx="minor">
+            <a:schemeClr val="tx1"/>
+          </a:fontRef>
+        </p:style>
+      </p:cxnSp>
+      <p:sp>
+        <p:nvSpPr>
+          <p:cNvPr id="32" name="TextBox 31"/>
+          <p:cNvSpPr txBox="1"/>
+          <p:nvPr/>
+        </p:nvSpPr>
+        <p:spPr>
+          <a:xfrm>
+            <a:off x="6553200" y="1447800"/>
+            <a:ext cx="685800" cy="276999"/>
+          </a:xfrm>
+          <a:prstGeom prst="rect">
+            <a:avLst/>
+          </a:prstGeom>
+          <a:noFill/>
+        </p:spPr>
+        <p:txBody>
+          <a:bodyPr wrap="square" rtlCol="0">
+            <a:spAutoFit/>
+          </a:bodyPr>
+          <a:lstStyle/>
+          <a:p>
+            <a:r>
+              <a:rPr lang="en-US" sz="1200" dirty="0" smtClean="0"/>
+              <a:t>Ticket</a:t>
+            </a:r>
+            <a:endParaRPr lang="en-US" sz="1200" dirty="0"/>
+          </a:p>
+        </p:txBody>
+      </p:sp>
+      <p:cxnSp>
+        <p:nvCxnSpPr>
+          <p:cNvPr id="33" name="Straight Arrow Connector 7"/>
+          <p:cNvCxnSpPr>
+            <a:stCxn id="4" idx="2"/>
+            <a:endCxn id="5" idx="7"/>
+          </p:cNvCxnSpPr>
+          <p:nvPr/>
+        </p:nvCxnSpPr>
+        <p:spPr>
+          <a:xfrm rot="10800000" flipV="1">
+            <a:off x="3848894" y="2057400"/>
+            <a:ext cx="1256507" cy="1003674"/>
+          </a:xfrm>
+          <a:prstGeom prst="curvedConnector2">
+            <a:avLst/>
+          </a:prstGeom>
+          <a:ln w="25400">
+            <a:solidFill>
+              <a:schemeClr val="tx1"/>
+            </a:solidFill>
+            <a:tailEnd type="arrow"/>
+          </a:ln>
+        </p:spPr>
+        <p:style>
+          <a:lnRef idx="1">
+            <a:schemeClr val="accent1"/>
+          </a:lnRef>
+          <a:fillRef idx="0">
+            <a:schemeClr val="accent1"/>
+          </a:fillRef>
+          <a:effectRef idx="0">
+            <a:schemeClr val="accent1"/>
+          </a:effectRef>
+          <a:fontRef idx="minor">
+            <a:schemeClr val="tx1"/>
+          </a:fontRef>
+        </p:style>
+      </p:cxnSp>
+      <p:sp>
+        <p:nvSpPr>
+          <p:cNvPr id="36" name="TextBox 35"/>
+          <p:cNvSpPr txBox="1"/>
+          <p:nvPr/>
+        </p:nvSpPr>
+        <p:spPr>
+          <a:xfrm>
+            <a:off x="4114800" y="2362200"/>
+            <a:ext cx="1600200" cy="461665"/>
+          </a:xfrm>
+          <a:prstGeom prst="rect">
+            <a:avLst/>
+          </a:prstGeom>
+          <a:noFill/>
+        </p:spPr>
+        <p:txBody>
+          <a:bodyPr wrap="square" rtlCol="0">
+            <a:spAutoFit/>
+          </a:bodyPr>
+          <a:lstStyle/>
+          <a:p>
+            <a:r>
+              <a:rPr lang="en-US" sz="1200" dirty="0" smtClean="0"/>
+              <a:t>Push</a:t>
+            </a:r>
+          </a:p>
+          <a:p>
+            <a:r>
+              <a:rPr lang="en-US" sz="1200" dirty="0" smtClean="0"/>
+              <a:t>[Increment Count]</a:t>
+            </a:r>
+          </a:p>
+        </p:txBody>
+      </p:sp>
+      <p:cxnSp>
+        <p:nvCxnSpPr>
+          <p:cNvPr id="52" name="Straight Arrow Connector 7"/>
+          <p:cNvCxnSpPr>
+            <a:stCxn id="4" idx="1"/>
+            <a:endCxn id="3" idx="7"/>
+          </p:cNvCxnSpPr>
+          <p:nvPr/>
+        </p:nvCxnSpPr>
+        <p:spPr>
+          <a:xfrm rot="16200000" flipH="1" flipV="1">
+            <a:off x="3924300" y="623467"/>
+            <a:ext cx="152400" cy="2589214"/>
+          </a:xfrm>
+          <a:prstGeom prst="curvedConnector3">
+            <a:avLst>
+              <a:gd name="adj1" fmla="val -208579"/>
+            </a:avLst>
+          </a:prstGeom>
+          <a:ln w="25400">
+            <a:solidFill>
+              <a:schemeClr val="tx1"/>
+            </a:solidFill>
+            <a:tailEnd type="arrow"/>
+          </a:ln>
+        </p:spPr>
+        <p:style>
+          <a:lnRef idx="1">
+            <a:schemeClr val="accent1"/>
+          </a:lnRef>
+          <a:fillRef idx="0">
+            <a:schemeClr val="accent1"/>
+          </a:fillRef>
+          <a:effectRef idx="0">
+            <a:schemeClr val="accent1"/>
+          </a:effectRef>
+          <a:fontRef idx="minor">
+            <a:schemeClr val="tx1"/>
+          </a:fontRef>
+        </p:style>
+      </p:cxnSp>
+      <p:sp>
+        <p:nvSpPr>
+          <p:cNvPr id="55" name="TextBox 54"/>
+          <p:cNvSpPr txBox="1"/>
+          <p:nvPr/>
+        </p:nvSpPr>
+        <p:spPr>
+          <a:xfrm>
+            <a:off x="3048000" y="1600200"/>
+            <a:ext cx="685800" cy="276999"/>
+          </a:xfrm>
+          <a:prstGeom prst="rect">
+            <a:avLst/>
+          </a:prstGeom>
+          <a:noFill/>
+        </p:spPr>
+        <p:txBody>
+          <a:bodyPr wrap="square" rtlCol="0">
+            <a:spAutoFit/>
+          </a:bodyPr>
+          <a:lstStyle/>
+          <a:p>
+            <a:r>
+              <a:rPr lang="en-US" sz="1200" dirty="0" smtClean="0"/>
+              <a:t>Off</a:t>
+            </a:r>
+            <a:endParaRPr lang="en-US" sz="1200" dirty="0"/>
+          </a:p>
+        </p:txBody>
+      </p:sp>
+    </p:spTree>
+  </p:cSld>
+  <p:clrMapOvr>
+    <a:masterClrMapping/>
+  </p:clrMapOvr>
+</p:sld>
+</file>
+
+<file path=ppt/slides/slide3.xml><?xml version="1.0" encoding="utf-8"?>
+<p:sld xmlns:a="http://schemas.openxmlformats.org/drawingml/2006/main" xmlns:r="http://schemas.openxmlformats.org/officeDocument/2006/relationships" xmlns:p="http://schemas.openxmlformats.org/presentationml/2006/main">
+  <p:cSld>
+    <p:spTree>
+      <p:nvGrpSpPr>
+        <p:cNvPr id="1" name=""/>
+        <p:cNvGrpSpPr/>
+        <p:nvPr/>
+      </p:nvGrpSpPr>
+      <p:grpSpPr>
+        <a:xfrm>
+          <a:off x="0" y="0"/>
+          <a:ext cx="0" cy="0"/>
+          <a:chOff x="0" y="0"/>
+          <a:chExt cx="0" cy="0"/>
+        </a:xfrm>
+      </p:grpSpPr>
+      <p:sp>
+        <p:nvSpPr>
+          <p:cNvPr id="2" name="Title 1"/>
+          <p:cNvSpPr>
+            <a:spLocks noGrp="1"/>
+          </p:cNvSpPr>
+          <p:nvPr>
+            <p:ph type="title"/>
+          </p:nvPr>
+        </p:nvSpPr>
+        <p:spPr/>
+        <p:txBody>
+          <a:bodyPr/>
+          <a:lstStyle/>
+          <a:p>
+            <a:r>
+              <a:rPr lang="en-US" dirty="0" smtClean="0"/>
               <a:t>XML Object Construction</a:t>
             </a:r>
             <a:endParaRPr lang="en-US" dirty="0"/>
@@ -4255,7 +5028,7 @@
 </p:sld>
 </file>
 
-<file path=ppt/slides/slide3.xml><?xml version="1.0" encoding="utf-8"?>
+<file path=ppt/slides/slide4.xml><?xml version="1.0" encoding="utf-8"?>
 <p:sld xmlns:a="http://schemas.openxmlformats.org/drawingml/2006/main" xmlns:r="http://schemas.openxmlformats.org/officeDocument/2006/relationships" xmlns:p="http://schemas.openxmlformats.org/presentationml/2006/main">
   <p:cSld>
     <p:spTree>

</xml_diff>